<commit_message>
Updated the testing presentation
</commit_message>
<xml_diff>
--- a/lesson-react-70-testing/react-testing.pptx
+++ b/lesson-react-70-testing/react-testing.pptx
@@ -1974,7 +1974,7 @@
           <a:noFill/>
           <a:extLst>
             <a:ext uri="{909E8E84-426E-40dd-AFC4-6F175D3DCCD1}">
-              <a14:hiddenFill xmlns:a14="http://schemas.microsoft.com/office/drawing/2010/main" xmlns="">
+              <a14:hiddenFill xmlns="" xmlns:a14="http://schemas.microsoft.com/office/drawing/2010/main">
                 <a:solidFill>
                   <a:srgbClr val="FFFFFF"/>
                 </a:solidFill>
@@ -16884,7 +16884,40 @@
               <a:rPr lang="en-US" dirty="0" smtClean="0">
                 <a:sym typeface="Wingdings"/>
               </a:rPr>
-              <a:t>Also selector methods</a:t>
+              <a:t>Returns a </a:t>
+            </a:r>
+            <a:r>
+              <a:rPr lang="en-US" dirty="0" smtClean="0">
+                <a:solidFill>
+                  <a:srgbClr val="FF0000"/>
+                </a:solidFill>
+                <a:sym typeface="Wingdings"/>
+              </a:rPr>
+              <a:t>COPY</a:t>
+            </a:r>
+            <a:r>
+              <a:rPr lang="en-US" dirty="0" smtClean="0">
+                <a:sym typeface="Wingdings"/>
+              </a:rPr>
+              <a:t> of the element, not a reference</a:t>
+            </a:r>
+          </a:p>
+          <a:p>
+            <a:pPr marL="342900" indent="-342900">
+              <a:buFont typeface="Arial" charset="0"/>
+              <a:buChar char="•"/>
+            </a:pPr>
+            <a:r>
+              <a:rPr lang="en-US" dirty="0" smtClean="0">
+                <a:sym typeface="Wingdings"/>
+              </a:rPr>
+              <a:t>Also </a:t>
+            </a:r>
+            <a:r>
+              <a:rPr lang="en-US" dirty="0" smtClean="0">
+                <a:sym typeface="Wingdings"/>
+              </a:rPr>
+              <a:t>selector methods</a:t>
             </a:r>
           </a:p>
           <a:p>

</xml_diff>

<commit_message>
Changed children[0] to children[1] - whoops
</commit_message>
<xml_diff>
--- a/lesson-react-70-testing/react-testing.pptx
+++ b/lesson-react-70-testing/react-testing.pptx
@@ -1974,7 +1974,7 @@
           <a:noFill/>
           <a:extLst>
             <a:ext uri="{909E8E84-426E-40dd-AFC4-6F175D3DCCD1}">
-              <a14:hiddenFill xmlns:a14="http://schemas.microsoft.com/office/drawing/2010/main" xmlns="">
+              <a14:hiddenFill xmlns="" xmlns:a14="http://schemas.microsoft.com/office/drawing/2010/main">
                 <a:solidFill>
                   <a:srgbClr val="FFFFFF"/>
                 </a:solidFill>
@@ -12019,11 +12019,7 @@
             </a:r>
             <a:r>
               <a:rPr lang="en-US" dirty="0" smtClean="0"/>
-              <a:t>]}&gt; &lt;</a:t>
-            </a:r>
-            <a:r>
-              <a:rPr lang="en-US" dirty="0" smtClean="0"/>
-              <a:t>span&gt;Click Here&lt;/span&gt;</a:t>
+              <a:t>]}&gt; &lt;span&gt;Click Here&lt;/span&gt;</a:t>
             </a:r>
             <a:r>
               <a:rPr lang="en-US" dirty="0"/>
@@ -12640,15 +12636,7 @@
             </a:r>
             <a:r>
               <a:rPr lang="en-US" dirty="0"/>
-              <a:t>={[Function</a:t>
-            </a:r>
-            <a:r>
-              <a:rPr lang="en-US" dirty="0"/>
-              <a:t>]}&gt; &lt;span&gt;Click Here&lt;/span&gt; </a:t>
-            </a:r>
-            <a:r>
-              <a:rPr lang="en-US" dirty="0"/>
-              <a:t/>
+              <a:t>={[Function]}&gt; &lt;span&gt;Click Here&lt;/span&gt; </a:t>
             </a:r>
             <a:br>
               <a:rPr lang="en-US" dirty="0"/>
@@ -13011,15 +12999,7 @@
             </a:r>
             <a:r>
               <a:rPr lang="en-US" dirty="0"/>
-              <a:t>={[Function</a:t>
-            </a:r>
-            <a:r>
-              <a:rPr lang="en-US" dirty="0"/>
-              <a:t>]}&gt; &lt;span&gt;Click Here&lt;/span&gt; </a:t>
-            </a:r>
-            <a:r>
-              <a:rPr lang="en-US" dirty="0"/>
-              <a:t/>
+              <a:t>={[Function]}&gt; &lt;span&gt;Click Here&lt;/span&gt; </a:t>
             </a:r>
             <a:br>
               <a:rPr lang="en-US" dirty="0"/>
@@ -13390,15 +13370,7 @@
             </a:r>
             <a:r>
               <a:rPr lang="en-US" dirty="0"/>
-              <a:t>={[Function</a:t>
-            </a:r>
-            <a:r>
-              <a:rPr lang="en-US" dirty="0"/>
-              <a:t>]}&gt; &lt;span&gt;Click Here&lt;/span&gt; </a:t>
-            </a:r>
-            <a:r>
-              <a:rPr lang="en-US" dirty="0"/>
-              <a:t/>
+              <a:t>={[Function]}&gt; &lt;span&gt;Click Here&lt;/span&gt; </a:t>
             </a:r>
             <a:br>
               <a:rPr lang="en-US" dirty="0"/>
@@ -13769,15 +13741,7 @@
             </a:r>
             <a:r>
               <a:rPr lang="en-US" dirty="0"/>
-              <a:t>={[Function</a:t>
-            </a:r>
-            <a:r>
-              <a:rPr lang="en-US" dirty="0"/>
-              <a:t>]}&gt; &lt;span&gt;Click Here&lt;/span&gt; </a:t>
-            </a:r>
-            <a:r>
-              <a:rPr lang="en-US" dirty="0"/>
-              <a:t/>
+              <a:t>={[Function]}&gt; &lt;span&gt;Click Here&lt;/span&gt; </a:t>
             </a:r>
             <a:br>
               <a:rPr lang="en-US" dirty="0"/>
@@ -14351,11 +14315,7 @@
             </a:r>
             <a:r>
               <a:rPr lang="en-US" dirty="0" smtClean="0"/>
-              <a:t>]}&gt; &lt;</a:t>
-            </a:r>
-            <a:r>
-              <a:rPr lang="en-US" dirty="0" smtClean="0"/>
-              <a:t>span&gt;Click Here&lt;/span&gt;</a:t>
+              <a:t>]}&gt; &lt;span&gt;Click Here&lt;/span&gt;</a:t>
             </a:r>
             <a:r>
               <a:rPr lang="en-US" dirty="0"/>
@@ -14643,15 +14603,7 @@
             </a:r>
             <a:r>
               <a:rPr lang="en-US" dirty="0"/>
-              <a:t>={[Function</a:t>
-            </a:r>
-            <a:r>
-              <a:rPr lang="en-US" dirty="0"/>
-              <a:t>]}&gt; &lt;span&gt;Click Here&lt;/span&gt; </a:t>
-            </a:r>
-            <a:r>
-              <a:rPr lang="en-US" dirty="0"/>
-              <a:t/>
+              <a:t>={[Function]}&gt; &lt;span&gt;Click Here&lt;/span&gt; </a:t>
             </a:r>
             <a:br>
               <a:rPr lang="en-US" dirty="0"/>
@@ -14961,15 +14913,7 @@
             </a:r>
             <a:r>
               <a:rPr lang="en-US" dirty="0"/>
-              <a:t>={[Function</a:t>
-            </a:r>
-            <a:r>
-              <a:rPr lang="en-US" dirty="0"/>
-              <a:t>]}&gt; &lt;span&gt;Click Here&lt;/span&gt; </a:t>
-            </a:r>
-            <a:r>
-              <a:rPr lang="en-US" dirty="0"/>
-              <a:t/>
+              <a:t>={[Function]}&gt; &lt;span&gt;Click Here&lt;/span&gt; </a:t>
             </a:r>
             <a:br>
               <a:rPr lang="en-US" dirty="0"/>
@@ -15133,7 +15077,7 @@
                   <a:srgbClr val="FF0000"/>
                 </a:solidFill>
               </a:rPr>
-              <a:t>[0].</a:t>
+              <a:t>[1].</a:t>
             </a:r>
             <a:r>
               <a:rPr lang="en-US" dirty="0" err="1" smtClean="0">
@@ -15320,15 +15264,7 @@
             </a:r>
             <a:r>
               <a:rPr lang="en-US" dirty="0"/>
-              <a:t>={[Function</a:t>
-            </a:r>
-            <a:r>
-              <a:rPr lang="en-US" dirty="0"/>
-              <a:t>]}&gt; &lt;span&gt;Click Here&lt;/span&gt; </a:t>
-            </a:r>
-            <a:r>
-              <a:rPr lang="en-US" dirty="0"/>
-              <a:t/>
+              <a:t>={[Function]}&gt; &lt;span&gt;Click Here&lt;/span&gt; </a:t>
             </a:r>
             <a:br>
               <a:rPr lang="en-US" dirty="0"/>
@@ -15479,20 +15415,12 @@
               <a:buChar char="•"/>
             </a:pPr>
             <a:r>
-              <a:rPr lang="en-US" dirty="0" err="1">
-                <a:solidFill>
-                  <a:srgbClr val="FF0000"/>
-                </a:solidFill>
-              </a:rPr>
-              <a:t>c</a:t>
-            </a:r>
-            <a:r>
               <a:rPr lang="en-US" dirty="0" err="1" smtClean="0">
                 <a:solidFill>
                   <a:srgbClr val="FF0000"/>
                 </a:solidFill>
               </a:rPr>
-              <a:t>omp.children</a:t>
+              <a:t>comp.children</a:t>
             </a:r>
             <a:r>
               <a:rPr lang="en-US" dirty="0" smtClean="0">
@@ -15500,7 +15428,7 @@
                   <a:srgbClr val="FF0000"/>
                 </a:solidFill>
               </a:rPr>
-              <a:t>[0].</a:t>
+              <a:t>[1].</a:t>
             </a:r>
             <a:r>
               <a:rPr lang="en-US" dirty="0" err="1" smtClean="0">
@@ -15598,7 +15526,7 @@
             </a:r>
             <a:r>
               <a:rPr lang="en-US" dirty="0" smtClean="0"/>
-              <a:t>[0].</a:t>
+              <a:t>[1].</a:t>
             </a:r>
             <a:r>
               <a:rPr lang="en-US" dirty="0" err="1" smtClean="0"/>
@@ -16542,11 +16470,6 @@
               </a:rPr>
               <a:t>Examples:</a:t>
             </a:r>
-            <a:endParaRPr lang="en-US" dirty="0" smtClean="0">
-              <a:solidFill>
-                <a:srgbClr val="FF0000"/>
-              </a:solidFill>
-            </a:endParaRPr>
           </a:p>
         </p:txBody>
       </p:sp>
@@ -16680,13 +16603,7 @@
               <a:rPr lang="en-US" dirty="0" smtClean="0">
                 <a:sym typeface="Wingdings"/>
               </a:rPr>
-              <a:t> with string </a:t>
-            </a:r>
-            <a:r>
-              <a:rPr lang="en-US" dirty="0" smtClean="0">
-                <a:sym typeface="Wingdings"/>
-              </a:rPr>
-              <a:t>selector, ”</a:t>
+              <a:t> with string selector, ”</a:t>
             </a:r>
             <a:r>
               <a:rPr lang="en-US" dirty="0" err="1" smtClean="0">
@@ -16731,32 +16648,23 @@
               <a:rPr lang="en-US" dirty="0" smtClean="0">
                 <a:sym typeface="Wingdings"/>
               </a:rPr>
-              <a:t> type of element (a String in shallow</a:t>
+              <a:t> type of element (a String in shallow), “</a:t>
+            </a:r>
+            <a:r>
+              <a:rPr lang="en-US" dirty="0" smtClean="0">
+                <a:solidFill>
+                  <a:srgbClr val="FF0000"/>
+                </a:solidFill>
+                <a:sym typeface="Wingdings"/>
+              </a:rPr>
+              <a:t>div</a:t>
             </a:r>
             <a:r>
               <a:rPr lang="en-US" dirty="0" smtClean="0">
                 <a:sym typeface="Wingdings"/>
               </a:rPr>
-              <a:t>), “</a:t>
-            </a:r>
-            <a:r>
-              <a:rPr lang="en-US" dirty="0" smtClean="0">
-                <a:solidFill>
-                  <a:srgbClr val="FF0000"/>
-                </a:solidFill>
-                <a:sym typeface="Wingdings"/>
-              </a:rPr>
-              <a:t>div</a:t>
-            </a:r>
-            <a:r>
-              <a:rPr lang="en-US" dirty="0" smtClean="0">
-                <a:sym typeface="Wingdings"/>
-              </a:rPr>
               <a:t>”</a:t>
             </a:r>
-            <a:endParaRPr lang="en-US" dirty="0" smtClean="0">
-              <a:sym typeface="Wingdings"/>
-            </a:endParaRPr>
           </a:p>
           <a:p>
             <a:pPr marL="631825" lvl="1" indent="-342900">
@@ -17030,179 +16938,152 @@
                 </a:solidFill>
                 <a:sym typeface="Wingdings"/>
               </a:rPr>
-              <a:t>.</a:t>
-            </a:r>
-            <a:r>
-              <a:rPr lang="en-US" dirty="0" smtClean="0">
-                <a:solidFill>
-                  <a:srgbClr val="FF0000"/>
-                </a:solidFill>
-                <a:sym typeface="Wingdings"/>
-              </a:rPr>
-              <a:t>block</a:t>
+              <a:t>.block</a:t>
             </a:r>
             <a:r>
               <a:rPr lang="en-US" dirty="0" smtClean="0">
                 <a:sym typeface="Wingdings"/>
               </a:rPr>
-              <a:t>’, </a:t>
+              <a:t>’,   ‘</a:t>
+            </a:r>
+            <a:r>
+              <a:rPr lang="en-US" dirty="0" err="1" smtClean="0">
+                <a:solidFill>
+                  <a:srgbClr val="FF0000"/>
+                </a:solidFill>
+                <a:sym typeface="Wingdings"/>
+              </a:rPr>
+              <a:t>p.none</a:t>
             </a:r>
             <a:r>
               <a:rPr lang="en-US" dirty="0" smtClean="0">
                 <a:sym typeface="Wingdings"/>
               </a:rPr>
-              <a:t>  ‘</a:t>
-            </a:r>
-            <a:r>
-              <a:rPr lang="en-US" dirty="0" err="1" smtClean="0">
-                <a:solidFill>
-                  <a:srgbClr val="FF0000"/>
-                </a:solidFill>
-                <a:sym typeface="Wingdings"/>
-              </a:rPr>
-              <a:t>p.none</a:t>
-            </a:r>
+              <a:t>’</a:t>
+            </a:r>
+          </a:p>
+          <a:p>
+            <a:pPr marL="631825" lvl="1" indent="-342900">
+              <a:buFont typeface="Arial" charset="0"/>
+              <a:buChar char="•"/>
+            </a:pPr>
             <a:r>
               <a:rPr lang="en-US" dirty="0" smtClean="0">
                 <a:sym typeface="Wingdings"/>
               </a:rPr>
-              <a:t>’</a:t>
-            </a:r>
-          </a:p>
-          <a:p>
-            <a:pPr marL="631825" lvl="1" indent="-342900">
-              <a:buFont typeface="Arial" charset="0"/>
-              <a:buChar char="•"/>
-            </a:pPr>
+              <a:t>ID  ‘</a:t>
+            </a:r>
+            <a:r>
+              <a:rPr lang="en-US" dirty="0" smtClean="0">
+                <a:solidFill>
+                  <a:srgbClr val="FF0000"/>
+                </a:solidFill>
+                <a:sym typeface="Wingdings"/>
+              </a:rPr>
+              <a:t>#</a:t>
+            </a:r>
+            <a:r>
+              <a:rPr lang="en-US" dirty="0" err="1" smtClean="0">
+                <a:solidFill>
+                  <a:srgbClr val="FF0000"/>
+                </a:solidFill>
+                <a:sym typeface="Wingdings"/>
+              </a:rPr>
+              <a:t>myComponentId</a:t>
+            </a:r>
             <a:r>
               <a:rPr lang="en-US" dirty="0" smtClean="0">
                 <a:sym typeface="Wingdings"/>
               </a:rPr>
-              <a:t>ID  ‘</a:t>
-            </a:r>
-            <a:r>
-              <a:rPr lang="en-US" dirty="0" smtClean="0">
-                <a:solidFill>
-                  <a:srgbClr val="FF0000"/>
-                </a:solidFill>
-                <a:sym typeface="Wingdings"/>
-              </a:rPr>
-              <a:t>#</a:t>
-            </a:r>
-            <a:r>
-              <a:rPr lang="en-US" dirty="0" err="1" smtClean="0">
-                <a:solidFill>
-                  <a:srgbClr val="FF0000"/>
-                </a:solidFill>
-                <a:sym typeface="Wingdings"/>
-              </a:rPr>
-              <a:t>myComponentId</a:t>
-            </a:r>
+              <a:t>’</a:t>
+            </a:r>
+          </a:p>
+          <a:p>
+            <a:pPr marL="342900" indent="-342900">
+              <a:buFont typeface="Arial" charset="0"/>
+              <a:buChar char="•"/>
+            </a:pPr>
             <a:r>
               <a:rPr lang="en-US" dirty="0" smtClean="0">
                 <a:sym typeface="Wingdings"/>
               </a:rPr>
-              <a:t>’</a:t>
-            </a:r>
-            <a:endParaRPr lang="en-US" dirty="0" smtClean="0">
-              <a:sym typeface="Wingdings"/>
-            </a:endParaRPr>
-          </a:p>
-          <a:p>
-            <a:pPr marL="342900" indent="-342900">
-              <a:buFont typeface="Arial" charset="0"/>
-              <a:buChar char="•"/>
-            </a:pPr>
+              <a:t>Returns a </a:t>
+            </a:r>
+            <a:r>
+              <a:rPr lang="en-US" dirty="0" smtClean="0">
+                <a:solidFill>
+                  <a:srgbClr val="FF0000"/>
+                </a:solidFill>
+                <a:sym typeface="Wingdings"/>
+              </a:rPr>
+              <a:t>COPY</a:t>
+            </a:r>
             <a:r>
               <a:rPr lang="en-US" dirty="0" smtClean="0">
                 <a:sym typeface="Wingdings"/>
               </a:rPr>
-              <a:t>Returns a </a:t>
-            </a:r>
-            <a:r>
-              <a:rPr lang="en-US" dirty="0" smtClean="0">
-                <a:solidFill>
-                  <a:srgbClr val="FF0000"/>
-                </a:solidFill>
-                <a:sym typeface="Wingdings"/>
-              </a:rPr>
-              <a:t>COPY</a:t>
-            </a:r>
+              <a:t> of the element, not a reference</a:t>
+            </a:r>
+          </a:p>
+          <a:p>
+            <a:pPr marL="342900" indent="-342900">
+              <a:buFont typeface="Arial" charset="0"/>
+              <a:buChar char="•"/>
+            </a:pPr>
             <a:r>
               <a:rPr lang="en-US" dirty="0" smtClean="0">
                 <a:sym typeface="Wingdings"/>
               </a:rPr>
-              <a:t> of the element, not a reference</a:t>
-            </a:r>
-          </a:p>
-          <a:p>
-            <a:pPr marL="342900" indent="-342900">
-              <a:buFont typeface="Arial" charset="0"/>
-              <a:buChar char="•"/>
-            </a:pPr>
+              <a:t>Also selector methods</a:t>
+            </a:r>
+          </a:p>
+          <a:p>
+            <a:pPr marL="631825" lvl="1" indent="-342900">
+              <a:buFont typeface="Arial" charset="0"/>
+              <a:buChar char="•"/>
+            </a:pPr>
+            <a:r>
+              <a:rPr lang="en-US" dirty="0">
+                <a:sym typeface="Wingdings"/>
+              </a:rPr>
+              <a:t>f</a:t>
+            </a:r>
             <a:r>
               <a:rPr lang="en-US" dirty="0" smtClean="0">
                 <a:sym typeface="Wingdings"/>
               </a:rPr>
-              <a:t>Also selector methods</a:t>
-            </a:r>
-          </a:p>
-          <a:p>
-            <a:pPr marL="631825" lvl="1" indent="-342900">
-              <a:buFont typeface="Arial" charset="0"/>
-              <a:buChar char="•"/>
-            </a:pPr>
-            <a:r>
-              <a:rPr lang="en-US" dirty="0">
+              <a:t>irst()  		 find(”</a:t>
+            </a:r>
+            <a:r>
+              <a:rPr lang="en-US" dirty="0" smtClean="0">
+                <a:solidFill>
+                  <a:srgbClr val="FF0000"/>
+                </a:solidFill>
                 <a:sym typeface="Wingdings"/>
               </a:rPr>
-              <a:t>f</a:t>
+              <a:t>div</a:t>
             </a:r>
             <a:r>
               <a:rPr lang="en-US" dirty="0" smtClean="0">
                 <a:sym typeface="Wingdings"/>
               </a:rPr>
-              <a:t>irst</a:t>
+              <a:t>”).first()   returns </a:t>
+            </a:r>
+            <a:r>
+              <a:rPr lang="en-US" dirty="0" smtClean="0">
+                <a:solidFill>
+                  <a:srgbClr val="FF0000"/>
+                </a:solidFill>
+                <a:sym typeface="Wingdings"/>
+              </a:rPr>
+              <a:t>ONE</a:t>
             </a:r>
             <a:r>
               <a:rPr lang="en-US" dirty="0" smtClean="0">
                 <a:sym typeface="Wingdings"/>
               </a:rPr>
-              <a:t>()  		 find(”</a:t>
-            </a:r>
-            <a:r>
-              <a:rPr lang="en-US" dirty="0" smtClean="0">
-                <a:solidFill>
-                  <a:srgbClr val="FF0000"/>
-                </a:solidFill>
-                <a:sym typeface="Wingdings"/>
-              </a:rPr>
-              <a:t>div</a:t>
-            </a:r>
-            <a:r>
-              <a:rPr lang="en-US" dirty="0" smtClean="0">
-                <a:sym typeface="Wingdings"/>
-              </a:rPr>
-              <a:t>”).first()   returns </a:t>
-            </a:r>
-            <a:r>
-              <a:rPr lang="en-US" dirty="0" smtClean="0">
-                <a:solidFill>
-                  <a:srgbClr val="FF0000"/>
-                </a:solidFill>
-                <a:sym typeface="Wingdings"/>
-              </a:rPr>
-              <a:t>ONE</a:t>
-            </a:r>
-            <a:r>
-              <a:rPr lang="en-US" dirty="0" smtClean="0">
-                <a:sym typeface="Wingdings"/>
-              </a:rPr>
               <a:t> &lt;div&gt; if it exists</a:t>
             </a:r>
-            <a:endParaRPr lang="en-US" dirty="0" smtClean="0">
-              <a:sym typeface="Wingdings"/>
-            </a:endParaRPr>
           </a:p>
           <a:p>
             <a:pPr marL="631825" lvl="1" indent="-342900">

</xml_diff>

<commit_message>
changed one child to two children
</commit_message>
<xml_diff>
--- a/lesson-react-70-testing/react-testing.pptx
+++ b/lesson-react-70-testing/react-testing.pptx
@@ -17798,11 +17798,23 @@
                   <a:srgbClr val="008000"/>
                 </a:solidFill>
               </a:rPr>
-              <a:t>'should have one child'</a:t>
+              <a:t>'should have </a:t>
+            </a:r>
+            <a:r>
+              <a:rPr lang="en-US" sz="1600" b="1" dirty="0" smtClean="0">
+                <a:solidFill>
+                  <a:srgbClr val="008000"/>
+                </a:solidFill>
+              </a:rPr>
+              <a:t>two children'</a:t>
+            </a:r>
+            <a:r>
+              <a:rPr lang="en-US" sz="1600" dirty="0" smtClean="0"/>
+              <a:t>, </a:t>
             </a:r>
             <a:r>
               <a:rPr lang="en-US" sz="1600" dirty="0"/>
-              <a:t>, () =&gt; {</a:t>
+              <a:t>() =&gt; {</a:t>
             </a:r>
             <a:br>
               <a:rPr lang="en-US" sz="1600" dirty="0"/>

</xml_diff>